<commit_message>
Main Menu And Levels Secion Done.
Designed The UI, Now Developing 2D Physics Engine for Internal Levels.
</commit_message>
<xml_diff>
--- a/Used Resorces (Temporary Folder or Non Major Folder)/Presentation1.pptx
+++ b/Used Resorces (Temporary Folder or Non Major Folder)/Presentation1.pptx
@@ -104,6 +104,22 @@
       </a:defRPr>
     </a:lvl9pPr>
   </p:defaultTextStyle>
+  <p:extLst>
+    <p:ext uri="{EFAFB233-063F-42B5-8137-9DF3F51BA10A}">
+      <p15:sldGuideLst xmlns:p15="http://schemas.microsoft.com/office/powerpoint/2012/main">
+        <p15:guide id="1" orient="horz" pos="2160" userDrawn="1">
+          <p15:clr>
+            <a:srgbClr val="A4A3A4"/>
+          </p15:clr>
+        </p15:guide>
+        <p15:guide id="2" pos="3840" userDrawn="1">
+          <p15:clr>
+            <a:srgbClr val="A4A3A4"/>
+          </p15:clr>
+        </p15:guide>
+      </p15:sldGuideLst>
+    </p:ext>
+  </p:extLst>
 </p:presentation>
 </file>
 
@@ -254,7 +270,7 @@
           <a:p>
             <a:fld id="{12DB90DA-074D-4604-BB27-A78E8BCB63CA}" type="datetimeFigureOut">
               <a:rPr lang="en-US" smtClean="0"/>
-              <a:t>8/31/2020</a:t>
+              <a:t>9/11/2020</a:t>
             </a:fld>
             <a:endParaRPr lang="en-US"/>
           </a:p>
@@ -452,7 +468,7 @@
           <a:p>
             <a:fld id="{12DB90DA-074D-4604-BB27-A78E8BCB63CA}" type="datetimeFigureOut">
               <a:rPr lang="en-US" smtClean="0"/>
-              <a:t>8/31/2020</a:t>
+              <a:t>9/11/2020</a:t>
             </a:fld>
             <a:endParaRPr lang="en-US"/>
           </a:p>
@@ -660,7 +676,7 @@
           <a:p>
             <a:fld id="{12DB90DA-074D-4604-BB27-A78E8BCB63CA}" type="datetimeFigureOut">
               <a:rPr lang="en-US" smtClean="0"/>
-              <a:t>8/31/2020</a:t>
+              <a:t>9/11/2020</a:t>
             </a:fld>
             <a:endParaRPr lang="en-US"/>
           </a:p>
@@ -858,7 +874,7 @@
           <a:p>
             <a:fld id="{12DB90DA-074D-4604-BB27-A78E8BCB63CA}" type="datetimeFigureOut">
               <a:rPr lang="en-US" smtClean="0"/>
-              <a:t>8/31/2020</a:t>
+              <a:t>9/11/2020</a:t>
             </a:fld>
             <a:endParaRPr lang="en-US"/>
           </a:p>
@@ -1133,7 +1149,7 @@
           <a:p>
             <a:fld id="{12DB90DA-074D-4604-BB27-A78E8BCB63CA}" type="datetimeFigureOut">
               <a:rPr lang="en-US" smtClean="0"/>
-              <a:t>8/31/2020</a:t>
+              <a:t>9/11/2020</a:t>
             </a:fld>
             <a:endParaRPr lang="en-US"/>
           </a:p>
@@ -1398,7 +1414,7 @@
           <a:p>
             <a:fld id="{12DB90DA-074D-4604-BB27-A78E8BCB63CA}" type="datetimeFigureOut">
               <a:rPr lang="en-US" smtClean="0"/>
-              <a:t>8/31/2020</a:t>
+              <a:t>9/11/2020</a:t>
             </a:fld>
             <a:endParaRPr lang="en-US"/>
           </a:p>
@@ -1810,7 +1826,7 @@
           <a:p>
             <a:fld id="{12DB90DA-074D-4604-BB27-A78E8BCB63CA}" type="datetimeFigureOut">
               <a:rPr lang="en-US" smtClean="0"/>
-              <a:t>8/31/2020</a:t>
+              <a:t>9/11/2020</a:t>
             </a:fld>
             <a:endParaRPr lang="en-US"/>
           </a:p>
@@ -1951,7 +1967,7 @@
           <a:p>
             <a:fld id="{12DB90DA-074D-4604-BB27-A78E8BCB63CA}" type="datetimeFigureOut">
               <a:rPr lang="en-US" smtClean="0"/>
-              <a:t>8/31/2020</a:t>
+              <a:t>9/11/2020</a:t>
             </a:fld>
             <a:endParaRPr lang="en-US"/>
           </a:p>
@@ -2064,7 +2080,7 @@
           <a:p>
             <a:fld id="{12DB90DA-074D-4604-BB27-A78E8BCB63CA}" type="datetimeFigureOut">
               <a:rPr lang="en-US" smtClean="0"/>
-              <a:t>8/31/2020</a:t>
+              <a:t>9/11/2020</a:t>
             </a:fld>
             <a:endParaRPr lang="en-US"/>
           </a:p>
@@ -2375,7 +2391,7 @@
           <a:p>
             <a:fld id="{12DB90DA-074D-4604-BB27-A78E8BCB63CA}" type="datetimeFigureOut">
               <a:rPr lang="en-US" smtClean="0"/>
-              <a:t>8/31/2020</a:t>
+              <a:t>9/11/2020</a:t>
             </a:fld>
             <a:endParaRPr lang="en-US"/>
           </a:p>
@@ -2663,7 +2679,7 @@
           <a:p>
             <a:fld id="{12DB90DA-074D-4604-BB27-A78E8BCB63CA}" type="datetimeFigureOut">
               <a:rPr lang="en-US" smtClean="0"/>
-              <a:t>8/31/2020</a:t>
+              <a:t>9/11/2020</a:t>
             </a:fld>
             <a:endParaRPr lang="en-US"/>
           </a:p>
@@ -2904,7 +2920,7 @@
           <a:p>
             <a:fld id="{12DB90DA-074D-4604-BB27-A78E8BCB63CA}" type="datetimeFigureOut">
               <a:rPr lang="en-US" smtClean="0"/>
-              <a:t>8/31/2020</a:t>
+              <a:t>9/11/2020</a:t>
             </a:fld>
             <a:endParaRPr lang="en-US"/>
           </a:p>
@@ -3372,7 +3388,7 @@
         <p:spPr>
           <a:xfrm>
             <a:off x="1857982" y="378403"/>
-            <a:ext cx="4983612" cy="2308471"/>
+            <a:ext cx="4942063" cy="2132977"/>
           </a:xfrm>
           <a:custGeom>
             <a:avLst/>
@@ -3823,6 +3839,334 @@
                 <a:latin typeface="Snap ITC" panose="04040A07060A02020202" pitchFamily="82" charset="0"/>
               </a:rPr>
               <a:t>Adventure</a:t>
+            </a:r>
+          </a:p>
+        </p:txBody>
+      </p:sp>
+      <p:sp>
+        <p:nvSpPr>
+          <p:cNvPr id="2" name="Rectangle 1">
+            <a:extLst>
+              <a:ext uri="{FF2B5EF4-FFF2-40B4-BE49-F238E27FC236}">
+                <a16:creationId xmlns:a16="http://schemas.microsoft.com/office/drawing/2014/main" id="{EAAC44AF-3B9A-4BD2-963D-CCDD5FF24633}"/>
+              </a:ext>
+            </a:extLst>
+          </p:cNvPr>
+          <p:cNvSpPr/>
+          <p:nvPr/>
+        </p:nvSpPr>
+        <p:spPr>
+          <a:xfrm>
+            <a:off x="2323682" y="3094149"/>
+            <a:ext cx="4010662" cy="669702"/>
+          </a:xfrm>
+          <a:prstGeom prst="rect">
+            <a:avLst/>
+          </a:prstGeom>
+          <a:solidFill>
+            <a:srgbClr val="7030A0"/>
+          </a:solidFill>
+        </p:spPr>
+        <p:style>
+          <a:lnRef idx="0">
+            <a:schemeClr val="dk1"/>
+          </a:lnRef>
+          <a:fillRef idx="3">
+            <a:schemeClr val="dk1"/>
+          </a:fillRef>
+          <a:effectRef idx="3">
+            <a:schemeClr val="dk1"/>
+          </a:effectRef>
+          <a:fontRef idx="minor">
+            <a:schemeClr val="lt1"/>
+          </a:fontRef>
+        </p:style>
+        <p:txBody>
+          <a:bodyPr rtlCol="0" anchor="ctr">
+            <a:scene3d>
+              <a:camera prst="orthographicFront"/>
+              <a:lightRig rig="harsh" dir="t"/>
+            </a:scene3d>
+            <a:sp3d extrusionH="57150" prstMaterial="matte">
+              <a:bevelT w="63500" h="12700" prst="relaxedInset"/>
+              <a:contourClr>
+                <a:schemeClr val="bg1">
+                  <a:lumMod val="65000"/>
+                </a:schemeClr>
+              </a:contourClr>
+            </a:sp3d>
+          </a:bodyPr>
+          <a:lstStyle/>
+          <a:p>
+            <a:pPr algn="ctr"/>
+            <a:r>
+              <a:rPr lang="en-US" sz="4400" b="1" dirty="0">
+                <a:ln/>
+                <a:solidFill>
+                  <a:srgbClr val="FF0000"/>
+                </a:solidFill>
+                <a:effectLst>
+                  <a:glow rad="228600">
+                    <a:schemeClr val="accent5">
+                      <a:satMod val="175000"/>
+                      <a:alpha val="40000"/>
+                    </a:schemeClr>
+                  </a:glow>
+                  <a:outerShdw blurRad="50800" dist="38100" dir="2700000" algn="tl" rotWithShape="0">
+                    <a:prstClr val="black">
+                      <a:alpha val="40000"/>
+                    </a:prstClr>
+                  </a:outerShdw>
+                  <a:reflection blurRad="6350" stA="55000" endA="300" endPos="45500" dir="5400000" sy="-100000" algn="bl" rotWithShape="0"/>
+                </a:effectLst>
+              </a:rPr>
+              <a:t>CONTINUE</a:t>
+            </a:r>
+          </a:p>
+        </p:txBody>
+      </p:sp>
+      <p:sp>
+        <p:nvSpPr>
+          <p:cNvPr id="7" name="Rectangle 6">
+            <a:extLst>
+              <a:ext uri="{FF2B5EF4-FFF2-40B4-BE49-F238E27FC236}">
+                <a16:creationId xmlns:a16="http://schemas.microsoft.com/office/drawing/2014/main" id="{697D3E52-D498-4426-9E51-F0AF3AFD9F52}"/>
+              </a:ext>
+            </a:extLst>
+          </p:cNvPr>
+          <p:cNvSpPr/>
+          <p:nvPr/>
+        </p:nvSpPr>
+        <p:spPr>
+          <a:xfrm>
+            <a:off x="2323682" y="3916235"/>
+            <a:ext cx="4010662" cy="669702"/>
+          </a:xfrm>
+          <a:prstGeom prst="rect">
+            <a:avLst/>
+          </a:prstGeom>
+          <a:solidFill>
+            <a:srgbClr val="7030A0"/>
+          </a:solidFill>
+        </p:spPr>
+        <p:style>
+          <a:lnRef idx="0">
+            <a:schemeClr val="dk1"/>
+          </a:lnRef>
+          <a:fillRef idx="3">
+            <a:schemeClr val="dk1"/>
+          </a:fillRef>
+          <a:effectRef idx="3">
+            <a:schemeClr val="dk1"/>
+          </a:effectRef>
+          <a:fontRef idx="minor">
+            <a:schemeClr val="lt1"/>
+          </a:fontRef>
+        </p:style>
+        <p:txBody>
+          <a:bodyPr rtlCol="0" anchor="ctr">
+            <a:scene3d>
+              <a:camera prst="orthographicFront"/>
+              <a:lightRig rig="harsh" dir="t"/>
+            </a:scene3d>
+            <a:sp3d extrusionH="57150" prstMaterial="matte">
+              <a:bevelT w="63500" h="12700" prst="relaxedInset"/>
+              <a:contourClr>
+                <a:schemeClr val="bg1">
+                  <a:lumMod val="65000"/>
+                </a:schemeClr>
+              </a:contourClr>
+            </a:sp3d>
+          </a:bodyPr>
+          <a:lstStyle/>
+          <a:p>
+            <a:pPr algn="ctr"/>
+            <a:r>
+              <a:rPr lang="en-US" sz="4400" b="1" dirty="0">
+                <a:ln/>
+                <a:solidFill>
+                  <a:srgbClr val="FF0000"/>
+                </a:solidFill>
+                <a:effectLst>
+                  <a:glow rad="228600">
+                    <a:schemeClr val="accent5">
+                      <a:satMod val="175000"/>
+                      <a:alpha val="40000"/>
+                    </a:schemeClr>
+                  </a:glow>
+                  <a:outerShdw blurRad="50800" dist="38100" dir="2700000" algn="tl" rotWithShape="0">
+                    <a:prstClr val="black">
+                      <a:alpha val="40000"/>
+                    </a:prstClr>
+                  </a:outerShdw>
+                  <a:reflection blurRad="6350" stA="55000" endA="300" endPos="45500" dir="5400000" sy="-100000" algn="bl" rotWithShape="0"/>
+                </a:effectLst>
+              </a:rPr>
+              <a:t>NEW GAME</a:t>
+            </a:r>
+          </a:p>
+        </p:txBody>
+      </p:sp>
+      <p:sp>
+        <p:nvSpPr>
+          <p:cNvPr id="8" name="Rectangle 7">
+            <a:extLst>
+              <a:ext uri="{FF2B5EF4-FFF2-40B4-BE49-F238E27FC236}">
+                <a16:creationId xmlns:a16="http://schemas.microsoft.com/office/drawing/2014/main" id="{F992548A-B4A0-4B7C-9C6B-37732364AD45}"/>
+              </a:ext>
+            </a:extLst>
+          </p:cNvPr>
+          <p:cNvSpPr/>
+          <p:nvPr/>
+        </p:nvSpPr>
+        <p:spPr>
+          <a:xfrm>
+            <a:off x="2323682" y="4738321"/>
+            <a:ext cx="4010662" cy="669702"/>
+          </a:xfrm>
+          <a:prstGeom prst="rect">
+            <a:avLst/>
+          </a:prstGeom>
+          <a:solidFill>
+            <a:srgbClr val="7030A0"/>
+          </a:solidFill>
+        </p:spPr>
+        <p:style>
+          <a:lnRef idx="0">
+            <a:schemeClr val="dk1"/>
+          </a:lnRef>
+          <a:fillRef idx="3">
+            <a:schemeClr val="dk1"/>
+          </a:fillRef>
+          <a:effectRef idx="3">
+            <a:schemeClr val="dk1"/>
+          </a:effectRef>
+          <a:fontRef idx="minor">
+            <a:schemeClr val="lt1"/>
+          </a:fontRef>
+        </p:style>
+        <p:txBody>
+          <a:bodyPr rtlCol="0" anchor="ctr">
+            <a:scene3d>
+              <a:camera prst="orthographicFront"/>
+              <a:lightRig rig="harsh" dir="t"/>
+            </a:scene3d>
+            <a:sp3d extrusionH="57150" prstMaterial="matte">
+              <a:bevelT w="63500" h="12700" prst="relaxedInset"/>
+              <a:contourClr>
+                <a:schemeClr val="bg1">
+                  <a:lumMod val="65000"/>
+                </a:schemeClr>
+              </a:contourClr>
+            </a:sp3d>
+          </a:bodyPr>
+          <a:lstStyle/>
+          <a:p>
+            <a:pPr algn="ctr"/>
+            <a:r>
+              <a:rPr lang="en-US" sz="4400" b="1" dirty="0">
+                <a:ln/>
+                <a:solidFill>
+                  <a:srgbClr val="FF0000"/>
+                </a:solidFill>
+                <a:effectLst>
+                  <a:glow rad="228600">
+                    <a:schemeClr val="accent5">
+                      <a:satMod val="175000"/>
+                      <a:alpha val="40000"/>
+                    </a:schemeClr>
+                  </a:glow>
+                  <a:outerShdw blurRad="50800" dist="38100" dir="2700000" algn="tl" rotWithShape="0">
+                    <a:prstClr val="black">
+                      <a:alpha val="40000"/>
+                    </a:prstClr>
+                  </a:outerShdw>
+                  <a:reflection blurRad="6350" stA="55000" endA="300" endPos="45500" dir="5400000" sy="-100000" algn="bl" rotWithShape="0"/>
+                </a:effectLst>
+              </a:rPr>
+              <a:t>LEVELS</a:t>
+            </a:r>
+          </a:p>
+        </p:txBody>
+      </p:sp>
+      <p:sp>
+        <p:nvSpPr>
+          <p:cNvPr id="12" name="Rectangle 11">
+            <a:extLst>
+              <a:ext uri="{FF2B5EF4-FFF2-40B4-BE49-F238E27FC236}">
+                <a16:creationId xmlns:a16="http://schemas.microsoft.com/office/drawing/2014/main" id="{AADE5C0D-AAE3-4ADB-9019-520090C29EBB}"/>
+              </a:ext>
+            </a:extLst>
+          </p:cNvPr>
+          <p:cNvSpPr/>
+          <p:nvPr/>
+        </p:nvSpPr>
+        <p:spPr>
+          <a:xfrm>
+            <a:off x="2323682" y="5560407"/>
+            <a:ext cx="4010662" cy="669702"/>
+          </a:xfrm>
+          <a:prstGeom prst="rect">
+            <a:avLst/>
+          </a:prstGeom>
+          <a:solidFill>
+            <a:srgbClr val="7030A0"/>
+          </a:solidFill>
+        </p:spPr>
+        <p:style>
+          <a:lnRef idx="0">
+            <a:schemeClr val="dk1"/>
+          </a:lnRef>
+          <a:fillRef idx="3">
+            <a:schemeClr val="dk1"/>
+          </a:fillRef>
+          <a:effectRef idx="3">
+            <a:schemeClr val="dk1"/>
+          </a:effectRef>
+          <a:fontRef idx="minor">
+            <a:schemeClr val="lt1"/>
+          </a:fontRef>
+        </p:style>
+        <p:txBody>
+          <a:bodyPr rtlCol="0" anchor="ctr">
+            <a:scene3d>
+              <a:camera prst="orthographicFront"/>
+              <a:lightRig rig="harsh" dir="t"/>
+            </a:scene3d>
+            <a:sp3d extrusionH="57150" prstMaterial="matte">
+              <a:bevelT w="63500" h="12700" prst="relaxedInset"/>
+              <a:contourClr>
+                <a:schemeClr val="bg1">
+                  <a:lumMod val="65000"/>
+                </a:schemeClr>
+              </a:contourClr>
+            </a:sp3d>
+          </a:bodyPr>
+          <a:lstStyle/>
+          <a:p>
+            <a:pPr algn="ctr"/>
+            <a:r>
+              <a:rPr lang="en-US" sz="4400" b="1" dirty="0">
+                <a:ln/>
+                <a:solidFill>
+                  <a:srgbClr val="FF0000"/>
+                </a:solidFill>
+                <a:effectLst>
+                  <a:glow rad="228600">
+                    <a:schemeClr val="accent5">
+                      <a:satMod val="175000"/>
+                      <a:alpha val="40000"/>
+                    </a:schemeClr>
+                  </a:glow>
+                  <a:outerShdw blurRad="50800" dist="38100" dir="2700000" algn="tl" rotWithShape="0">
+                    <a:prstClr val="black">
+                      <a:alpha val="40000"/>
+                    </a:prstClr>
+                  </a:outerShdw>
+                  <a:reflection blurRad="6350" stA="55000" endA="300" endPos="45500" dir="5400000" sy="-100000" algn="bl" rotWithShape="0"/>
+                </a:effectLst>
+              </a:rPr>
+              <a:t>EXIT</a:t>
             </a:r>
           </a:p>
         </p:txBody>

</xml_diff>